<commit_message>
updated presentation with timers/dma shit
</commit_message>
<xml_diff>
--- a/Meerkats_Presentation.pptx
+++ b/Meerkats_Presentation.pptx
@@ -5,10 +5,10 @@
     <p:sldMasterId id="2147483660" r:id="rId1"/>
   </p:sldMasterIdLst>
   <p:notesMasterIdLst>
-    <p:notesMasterId r:id="rId24"/>
+    <p:notesMasterId r:id="rId25"/>
   </p:notesMasterIdLst>
   <p:handoutMasterIdLst>
-    <p:handoutMasterId r:id="rId25"/>
+    <p:handoutMasterId r:id="rId26"/>
   </p:handoutMasterIdLst>
   <p:sldIdLst>
     <p:sldId id="256" r:id="rId2"/>
@@ -24,15 +24,16 @@
     <p:sldId id="259" r:id="rId12"/>
     <p:sldId id="265" r:id="rId13"/>
     <p:sldId id="266" r:id="rId14"/>
-    <p:sldId id="269" r:id="rId15"/>
-    <p:sldId id="270" r:id="rId16"/>
-    <p:sldId id="271" r:id="rId17"/>
-    <p:sldId id="274" r:id="rId18"/>
-    <p:sldId id="275" r:id="rId19"/>
-    <p:sldId id="276" r:id="rId20"/>
-    <p:sldId id="277" r:id="rId21"/>
-    <p:sldId id="278" r:id="rId22"/>
-    <p:sldId id="272" r:id="rId23"/>
+    <p:sldId id="279" r:id="rId15"/>
+    <p:sldId id="269" r:id="rId16"/>
+    <p:sldId id="270" r:id="rId17"/>
+    <p:sldId id="271" r:id="rId18"/>
+    <p:sldId id="274" r:id="rId19"/>
+    <p:sldId id="275" r:id="rId20"/>
+    <p:sldId id="276" r:id="rId21"/>
+    <p:sldId id="277" r:id="rId22"/>
+    <p:sldId id="278" r:id="rId23"/>
+    <p:sldId id="272" r:id="rId24"/>
   </p:sldIdLst>
   <p:sldSz cx="9144000" cy="6858000" type="screen4x3"/>
   <p:notesSz cx="6858000" cy="9144000"/>
@@ -6443,6 +6444,144 @@
           <a:p>
             <a:r>
               <a:rPr lang="en-US" dirty="0" smtClean="0"/>
+              <a:t>Timers/DMA</a:t>
+            </a:r>
+            <a:endParaRPr lang="en-US" dirty="0"/>
+          </a:p>
+        </p:txBody>
+      </p:sp>
+      <p:sp>
+        <p:nvSpPr>
+          <p:cNvPr id="3" name="Content Placeholder 2"/>
+          <p:cNvSpPr>
+            <a:spLocks noGrp="1"/>
+          </p:cNvSpPr>
+          <p:nvPr>
+            <p:ph idx="1"/>
+          </p:nvPr>
+        </p:nvSpPr>
+        <p:spPr/>
+        <p:txBody>
+          <a:bodyPr>
+            <a:normAutofit/>
+          </a:bodyPr>
+          <a:lstStyle/>
+          <a:p>
+            <a:r>
+              <a:rPr lang="en-US" dirty="0" smtClean="0"/>
+              <a:t>Timer generates an interrupt on overflow</a:t>
+            </a:r>
+          </a:p>
+          <a:p>
+            <a:pPr lvl="1"/>
+            <a:r>
+              <a:rPr lang="en-US" dirty="0"/>
+              <a:t>Selectable frequencies</a:t>
+            </a:r>
+          </a:p>
+          <a:p>
+            <a:pPr lvl="1"/>
+            <a:r>
+              <a:rPr lang="en-US" dirty="0"/>
+              <a:t>Enable/Disable</a:t>
+            </a:r>
+          </a:p>
+          <a:p>
+            <a:pPr lvl="1"/>
+            <a:r>
+              <a:rPr lang="en-US" dirty="0"/>
+              <a:t>Adjustable overflow reset </a:t>
+            </a:r>
+            <a:r>
+              <a:rPr lang="en-US" dirty="0" smtClean="0"/>
+              <a:t>value</a:t>
+            </a:r>
+          </a:p>
+          <a:p>
+            <a:r>
+              <a:rPr lang="en-US" dirty="0" smtClean="0"/>
+              <a:t>DMA module that copies sections of memory</a:t>
+            </a:r>
+          </a:p>
+          <a:p>
+            <a:pPr lvl="1"/>
+            <a:r>
+              <a:rPr lang="en-US" dirty="0" smtClean="0"/>
+              <a:t>Roughly 8 times faster than CPU copying</a:t>
+            </a:r>
+          </a:p>
+        </p:txBody>
+      </p:sp>
+      <p:sp>
+        <p:nvSpPr>
+          <p:cNvPr id="4" name="Slide Number Placeholder 3"/>
+          <p:cNvSpPr>
+            <a:spLocks noGrp="1"/>
+          </p:cNvSpPr>
+          <p:nvPr>
+            <p:ph type="sldNum" sz="quarter" idx="12"/>
+          </p:nvPr>
+        </p:nvSpPr>
+        <p:spPr/>
+        <p:txBody>
+          <a:bodyPr/>
+          <a:lstStyle/>
+          <a:p>
+            <a:fld id="{9F2F5E10-5301-4EE6-90D2-A6C4A3F62BED}" type="slidenum">
+              <a:rPr lang="en-US" smtClean="0"/>
+              <a:t>14</a:t>
+            </a:fld>
+            <a:endParaRPr lang="en-US"/>
+          </a:p>
+        </p:txBody>
+      </p:sp>
+    </p:spTree>
+    <p:extLst>
+      <p:ext uri="{BB962C8B-B14F-4D97-AF65-F5344CB8AC3E}">
+        <p14:creationId xmlns:p14="http://schemas.microsoft.com/office/powerpoint/2010/main" val="3292038413"/>
+      </p:ext>
+    </p:extLst>
+  </p:cSld>
+  <p:clrMapOvr>
+    <a:masterClrMapping/>
+  </p:clrMapOvr>
+</p:sld>
+</file>
+
+<file path=ppt/slides/slide15.xml><?xml version="1.0" encoding="utf-8"?>
+<p:sld xmlns:a="http://schemas.openxmlformats.org/drawingml/2006/main" xmlns:r="http://schemas.openxmlformats.org/officeDocument/2006/relationships" xmlns:p="http://schemas.openxmlformats.org/presentationml/2006/main">
+  <p:cSld>
+    <p:spTree>
+      <p:nvGrpSpPr>
+        <p:cNvPr id="1" name=""/>
+        <p:cNvGrpSpPr/>
+        <p:nvPr/>
+      </p:nvGrpSpPr>
+      <p:grpSpPr>
+        <a:xfrm>
+          <a:off x="0" y="0"/>
+          <a:ext cx="0" cy="0"/>
+          <a:chOff x="0" y="0"/>
+          <a:chExt cx="0" cy="0"/>
+        </a:xfrm>
+      </p:grpSpPr>
+      <p:sp>
+        <p:nvSpPr>
+          <p:cNvPr id="2" name="Title 1"/>
+          <p:cNvSpPr>
+            <a:spLocks noGrp="1"/>
+          </p:cNvSpPr>
+          <p:nvPr>
+            <p:ph type="title"/>
+          </p:nvPr>
+        </p:nvSpPr>
+        <p:spPr/>
+        <p:txBody>
+          <a:bodyPr/>
+          <a:lstStyle/>
+          <a:p>
+            <a:r>
+              <a:rPr lang="en-US" dirty="0" smtClean="0"/>
               <a:t>Memory</a:t>
             </a:r>
             <a:endParaRPr lang="en-US" dirty="0"/>
@@ -6481,7 +6620,6 @@
               <a:rPr lang="en-US" dirty="0" smtClean="0"/>
               <a:t>Block RAM</a:t>
             </a:r>
-            <a:endParaRPr lang="en-US" dirty="0" smtClean="0"/>
           </a:p>
           <a:p>
             <a:pPr lvl="1"/>
@@ -6517,7 +6655,6 @@
               <a:rPr lang="en-US" dirty="0" smtClean="0"/>
               <a:t>Synthesizes in a finite amount of time</a:t>
             </a:r>
-            <a:endParaRPr lang="en-US" dirty="0" smtClean="0"/>
           </a:p>
           <a:p>
             <a:r>
@@ -6545,7 +6682,7 @@
           <a:p>
             <a:fld id="{9F2F5E10-5301-4EE6-90D2-A6C4A3F62BED}" type="slidenum">
               <a:rPr lang="en-US" smtClean="0"/>
-              <a:t>14</a:t>
+              <a:t>15</a:t>
             </a:fld>
             <a:endParaRPr lang="en-US"/>
           </a:p>
@@ -6571,7 +6708,7 @@
 </p:sld>
 </file>
 
-<file path=ppt/slides/slide15.xml><?xml version="1.0" encoding="utf-8"?>
+<file path=ppt/slides/slide16.xml><?xml version="1.0" encoding="utf-8"?>
 <p:sld xmlns:a="http://schemas.openxmlformats.org/drawingml/2006/main" xmlns:r="http://schemas.openxmlformats.org/officeDocument/2006/relationships" xmlns:p="http://schemas.openxmlformats.org/presentationml/2006/main">
   <p:cSld>
     <p:spTree>
@@ -6730,7 +6867,7 @@
           <a:p>
             <a:fld id="{9F2F5E10-5301-4EE6-90D2-A6C4A3F62BED}" type="slidenum">
               <a:rPr lang="en-US" smtClean="0"/>
-              <a:t>15</a:t>
+              <a:t>16</a:t>
             </a:fld>
             <a:endParaRPr lang="en-US"/>
           </a:p>
@@ -6740,131 +6877,6 @@
     <p:extLst>
       <p:ext uri="{BB962C8B-B14F-4D97-AF65-F5344CB8AC3E}">
         <p14:creationId xmlns:p14="http://schemas.microsoft.com/office/powerpoint/2010/main" val="29583097"/>
-      </p:ext>
-    </p:extLst>
-  </p:cSld>
-  <p:clrMapOvr>
-    <a:masterClrMapping/>
-  </p:clrMapOvr>
-  <p:timing>
-    <p:tnLst>
-      <p:par>
-        <p:cTn id="1" dur="indefinite" restart="never" nodeType="tmRoot"/>
-      </p:par>
-    </p:tnLst>
-  </p:timing>
-</p:sld>
-</file>
-
-<file path=ppt/slides/slide16.xml><?xml version="1.0" encoding="utf-8"?>
-<p:sld xmlns:a="http://schemas.openxmlformats.org/drawingml/2006/main" xmlns:r="http://schemas.openxmlformats.org/officeDocument/2006/relationships" xmlns:p="http://schemas.openxmlformats.org/presentationml/2006/main">
-  <p:cSld>
-    <p:spTree>
-      <p:nvGrpSpPr>
-        <p:cNvPr id="1" name=""/>
-        <p:cNvGrpSpPr/>
-        <p:nvPr/>
-      </p:nvGrpSpPr>
-      <p:grpSpPr>
-        <a:xfrm>
-          <a:off x="0" y="0"/>
-          <a:ext cx="0" cy="0"/>
-          <a:chOff x="0" y="0"/>
-          <a:chExt cx="0" cy="0"/>
-        </a:xfrm>
-      </p:grpSpPr>
-      <p:sp>
-        <p:nvSpPr>
-          <p:cNvPr id="2" name="Title 1"/>
-          <p:cNvSpPr>
-            <a:spLocks noGrp="1"/>
-          </p:cNvSpPr>
-          <p:nvPr>
-            <p:ph type="title"/>
-          </p:nvPr>
-        </p:nvSpPr>
-        <p:spPr/>
-        <p:txBody>
-          <a:bodyPr/>
-          <a:lstStyle/>
-          <a:p>
-            <a:r>
-              <a:rPr lang="en-US" dirty="0" smtClean="0"/>
-              <a:t>Problems</a:t>
-            </a:r>
-            <a:endParaRPr lang="en-US" dirty="0"/>
-          </a:p>
-        </p:txBody>
-      </p:sp>
-      <p:sp>
-        <p:nvSpPr>
-          <p:cNvPr id="3" name="Content Placeholder 2"/>
-          <p:cNvSpPr>
-            <a:spLocks noGrp="1"/>
-          </p:cNvSpPr>
-          <p:nvPr>
-            <p:ph idx="1"/>
-          </p:nvPr>
-        </p:nvSpPr>
-        <p:spPr/>
-        <p:txBody>
-          <a:bodyPr/>
-          <a:lstStyle/>
-          <a:p>
-            <a:r>
-              <a:rPr lang="en-US" dirty="0" smtClean="0"/>
-              <a:t>We only get to the Tetris starting credits</a:t>
-            </a:r>
-          </a:p>
-          <a:p>
-            <a:r>
-              <a:rPr lang="en-US" dirty="0" err="1" smtClean="0"/>
-              <a:t>ChipScope</a:t>
-            </a:r>
-            <a:r>
-              <a:rPr lang="en-US" dirty="0" smtClean="0"/>
-              <a:t> is a pain in the ass</a:t>
-            </a:r>
-          </a:p>
-          <a:p>
-            <a:r>
-              <a:rPr lang="en-US" dirty="0" smtClean="0"/>
-              <a:t>The RHEL machines we’re using are completely unstable</a:t>
-            </a:r>
-            <a:endParaRPr lang="en-US" dirty="0" smtClean="0"/>
-          </a:p>
-          <a:p>
-            <a:endParaRPr lang="en-US" dirty="0"/>
-          </a:p>
-        </p:txBody>
-      </p:sp>
-      <p:sp>
-        <p:nvSpPr>
-          <p:cNvPr id="5" name="Slide Number Placeholder 4"/>
-          <p:cNvSpPr>
-            <a:spLocks noGrp="1"/>
-          </p:cNvSpPr>
-          <p:nvPr>
-            <p:ph type="sldNum" sz="quarter" idx="12"/>
-          </p:nvPr>
-        </p:nvSpPr>
-        <p:spPr/>
-        <p:txBody>
-          <a:bodyPr/>
-          <a:lstStyle/>
-          <a:p>
-            <a:fld id="{9F2F5E10-5301-4EE6-90D2-A6C4A3F62BED}" type="slidenum">
-              <a:rPr lang="en-US" smtClean="0"/>
-              <a:t>16</a:t>
-            </a:fld>
-            <a:endParaRPr lang="en-US"/>
-          </a:p>
-        </p:txBody>
-      </p:sp>
-    </p:spTree>
-    <p:extLst>
-      <p:ext uri="{BB962C8B-B14F-4D97-AF65-F5344CB8AC3E}">
-        <p14:creationId xmlns:p14="http://schemas.microsoft.com/office/powerpoint/2010/main" val="1528139837"/>
       </p:ext>
     </p:extLst>
   </p:cSld>
@@ -6915,7 +6927,7 @@
           <a:p>
             <a:r>
               <a:rPr lang="en-US" dirty="0" smtClean="0"/>
-              <a:t>Goals</a:t>
+              <a:t>Problems</a:t>
             </a:r>
             <a:endParaRPr lang="en-US" dirty="0"/>
           </a:p>
@@ -6938,26 +6950,33 @@
           <a:p>
             <a:r>
               <a:rPr lang="en-US" dirty="0" smtClean="0"/>
-              <a:t>Wednesday: Start screen?</a:t>
-            </a:r>
-          </a:p>
-          <a:p>
-            <a:r>
-              <a:rPr lang="en-US" dirty="0" smtClean="0"/>
-              <a:t>Thursday: Start screen</a:t>
-            </a:r>
-          </a:p>
-          <a:p>
-            <a:r>
-              <a:rPr lang="en-US" dirty="0" smtClean="0"/>
-              <a:t>Next Monday: Possibly buggy gameplay</a:t>
-            </a:r>
-          </a:p>
-        </p:txBody>
-      </p:sp>
-      <p:sp>
-        <p:nvSpPr>
-          <p:cNvPr id="4" name="Slide Number Placeholder 3"/>
+              <a:t>We only get to the Tetris starting credits</a:t>
+            </a:r>
+          </a:p>
+          <a:p>
+            <a:r>
+              <a:rPr lang="en-US" dirty="0" err="1" smtClean="0"/>
+              <a:t>ChipScope</a:t>
+            </a:r>
+            <a:r>
+              <a:rPr lang="en-US" dirty="0" smtClean="0"/>
+              <a:t> is a pain in the ass</a:t>
+            </a:r>
+          </a:p>
+          <a:p>
+            <a:r>
+              <a:rPr lang="en-US" dirty="0" smtClean="0"/>
+              <a:t>The RHEL machines we’re using are completely unstable</a:t>
+            </a:r>
+          </a:p>
+          <a:p>
+            <a:endParaRPr lang="en-US" dirty="0"/>
+          </a:p>
+        </p:txBody>
+      </p:sp>
+      <p:sp>
+        <p:nvSpPr>
+          <p:cNvPr id="5" name="Slide Number Placeholder 4"/>
           <p:cNvSpPr>
             <a:spLocks noGrp="1"/>
           </p:cNvSpPr>
@@ -6981,13 +7000,20 @@
     </p:spTree>
     <p:extLst>
       <p:ext uri="{BB962C8B-B14F-4D97-AF65-F5344CB8AC3E}">
-        <p14:creationId xmlns:p14="http://schemas.microsoft.com/office/powerpoint/2010/main" val="1609834906"/>
+        <p14:creationId xmlns:p14="http://schemas.microsoft.com/office/powerpoint/2010/main" val="1528139837"/>
       </p:ext>
     </p:extLst>
   </p:cSld>
   <p:clrMapOvr>
     <a:masterClrMapping/>
   </p:clrMapOvr>
+  <p:timing>
+    <p:tnLst>
+      <p:par>
+        <p:cTn id="1" dur="indefinite" restart="never" nodeType="tmRoot"/>
+      </p:par>
+    </p:tnLst>
+  </p:timing>
 </p:sld>
 </file>
 
@@ -7025,7 +7051,7 @@
           <a:p>
             <a:r>
               <a:rPr lang="en-US" dirty="0" smtClean="0"/>
-              <a:t>Conclusions</a:t>
+              <a:t>Goals</a:t>
             </a:r>
             <a:endParaRPr lang="en-US" dirty="0"/>
           </a:p>
@@ -7041,71 +7067,27 @@
             <p:ph idx="1"/>
           </p:nvPr>
         </p:nvSpPr>
-        <p:spPr>
-          <a:xfrm>
-            <a:off x="739775" y="2261286"/>
-            <a:ext cx="7662864" cy="3775977"/>
-          </a:xfrm>
-        </p:spPr>
-        <p:txBody>
-          <a:bodyPr>
-            <a:normAutofit fontScale="92500" lnSpcReduction="10000"/>
-          </a:bodyPr>
-          <a:lstStyle/>
-          <a:p>
-            <a:r>
-              <a:rPr lang="en-US" dirty="0" smtClean="0"/>
-              <a:t>If your project involves implementing a CPU/using a buggy one…</a:t>
-            </a:r>
-          </a:p>
-          <a:p>
-            <a:pPr lvl="1"/>
-            <a:r>
-              <a:rPr lang="en-US" dirty="0" smtClean="0"/>
-              <a:t>Find a new project</a:t>
-            </a:r>
-          </a:p>
-          <a:p>
-            <a:pPr lvl="1"/>
-            <a:r>
-              <a:rPr lang="en-US" dirty="0" smtClean="0"/>
-              <a:t>Testing a buggy CPU requires understanding of it’s implementation (i.e. you’ve already implemented it)</a:t>
-            </a:r>
-          </a:p>
-          <a:p>
-            <a:pPr lvl="1"/>
-            <a:r>
-              <a:rPr lang="en-US" dirty="0" smtClean="0"/>
-              <a:t>Implementing a CPU means it will be buggy and you will have to test it</a:t>
-            </a:r>
-          </a:p>
-          <a:p>
-            <a:pPr lvl="1"/>
-            <a:r>
-              <a:rPr lang="en-US" dirty="0" smtClean="0"/>
-              <a:t>Takes a long, long time either way</a:t>
-            </a:r>
-          </a:p>
-          <a:p>
-            <a:r>
-              <a:rPr lang="en-US" dirty="0" smtClean="0"/>
-              <a:t>If your project involves Xilinx…</a:t>
-            </a:r>
-          </a:p>
-          <a:p>
-            <a:pPr lvl="1"/>
-            <a:r>
-              <a:rPr lang="en-US" dirty="0" smtClean="0"/>
-              <a:t>Install Windows on the lab machines</a:t>
-            </a:r>
-          </a:p>
-          <a:p>
-            <a:pPr lvl="1"/>
-            <a:r>
-              <a:rPr lang="en-US" dirty="0" smtClean="0"/>
-              <a:t>Seriously, what the fuck is going on</a:t>
-            </a:r>
-            <a:endParaRPr lang="en-US" dirty="0"/>
+        <p:spPr/>
+        <p:txBody>
+          <a:bodyPr/>
+          <a:lstStyle/>
+          <a:p>
+            <a:r>
+              <a:rPr lang="en-US" dirty="0" smtClean="0"/>
+              <a:t>Wednesday: Start screen?</a:t>
+            </a:r>
+          </a:p>
+          <a:p>
+            <a:r>
+              <a:rPr lang="en-US" dirty="0" smtClean="0"/>
+              <a:t>Thursday: Start screen</a:t>
+            </a:r>
+          </a:p>
+          <a:p>
+            <a:r>
+              <a:rPr lang="en-US" dirty="0" smtClean="0"/>
+              <a:t>Next Monday: Possibly buggy gameplay</a:t>
+            </a:r>
           </a:p>
         </p:txBody>
       </p:sp>
@@ -7135,7 +7117,7 @@
     </p:spTree>
     <p:extLst>
       <p:ext uri="{BB962C8B-B14F-4D97-AF65-F5344CB8AC3E}">
-        <p14:creationId xmlns:p14="http://schemas.microsoft.com/office/powerpoint/2010/main" val="3004513485"/>
+        <p14:creationId xmlns:p14="http://schemas.microsoft.com/office/powerpoint/2010/main" val="1609834906"/>
       </p:ext>
     </p:extLst>
   </p:cSld>
@@ -7197,75 +7179,69 @@
         </p:nvSpPr>
         <p:spPr>
           <a:xfrm>
-            <a:off x="739775" y="2088292"/>
-            <a:ext cx="7662864" cy="3948972"/>
+            <a:off x="739775" y="2261286"/>
+            <a:ext cx="7662864" cy="3775977"/>
           </a:xfrm>
         </p:spPr>
         <p:txBody>
           <a:bodyPr>
-            <a:normAutofit/>
+            <a:normAutofit fontScale="92500" lnSpcReduction="10000"/>
           </a:bodyPr>
           <a:lstStyle/>
           <a:p>
             <a:r>
-              <a:rPr lang="en-US" dirty="0" err="1" smtClean="0"/>
-              <a:t>ChipScope</a:t>
-            </a:r>
-            <a:r>
-              <a:rPr lang="en-US" dirty="0" smtClean="0"/>
-              <a:t>, you are our only hope</a:t>
-            </a:r>
-          </a:p>
-          <a:p>
-            <a:r>
-              <a:rPr lang="en-US" dirty="0" smtClean="0"/>
-              <a:t>Don’t take 18-349</a:t>
+              <a:rPr lang="en-US" dirty="0" smtClean="0"/>
+              <a:t>If your project involves implementing a CPU/using a buggy one…</a:t>
             </a:r>
           </a:p>
           <a:p>
             <a:pPr lvl="1"/>
             <a:r>
-              <a:rPr lang="en-US" dirty="0"/>
-              <a:t>Ever</a:t>
+              <a:rPr lang="en-US" dirty="0" smtClean="0"/>
+              <a:t>Find a new project</a:t>
             </a:r>
           </a:p>
           <a:p>
             <a:pPr lvl="1"/>
             <a:r>
-              <a:rPr lang="en-US" dirty="0"/>
-              <a:t>For any reason</a:t>
-            </a:r>
-          </a:p>
-          <a:p>
-            <a:r>
-              <a:rPr lang="en-US" dirty="0" smtClean="0"/>
-              <a:t>The Virtex-7-based VC707 is not a good board for this class</a:t>
+              <a:rPr lang="en-US" dirty="0" smtClean="0"/>
+              <a:t>Testing a buggy CPU requires understanding of it’s implementation (i.e. you’ve already implemented it)</a:t>
             </a:r>
           </a:p>
           <a:p>
             <a:pPr lvl="1"/>
             <a:r>
               <a:rPr lang="en-US" dirty="0" smtClean="0"/>
-              <a:t>Until someone writes a </a:t>
-            </a:r>
-            <a:r>
-              <a:rPr lang="en-US" dirty="0" err="1" smtClean="0"/>
-              <a:t>SystemVerilog</a:t>
-            </a:r>
-            <a:r>
-              <a:rPr lang="en-US" dirty="0" smtClean="0"/>
-              <a:t> HDMI driver</a:t>
+              <a:t>Implementing a CPU means it will be buggy and you will have to test it</a:t>
             </a:r>
           </a:p>
           <a:p>
             <a:pPr lvl="1"/>
             <a:r>
               <a:rPr lang="en-US" dirty="0" smtClean="0"/>
-              <a:t>Or buys an expansion board with GPIO, VGA, and an AC97 chip</a:t>
-            </a:r>
-          </a:p>
-          <a:p>
-            <a:endParaRPr lang="en-US" dirty="0" smtClean="0"/>
+              <a:t>Takes a long, long time either way</a:t>
+            </a:r>
+          </a:p>
+          <a:p>
+            <a:r>
+              <a:rPr lang="en-US" dirty="0" smtClean="0"/>
+              <a:t>If your project involves Xilinx…</a:t>
+            </a:r>
+          </a:p>
+          <a:p>
+            <a:pPr lvl="1"/>
+            <a:r>
+              <a:rPr lang="en-US" dirty="0" smtClean="0"/>
+              <a:t>Install Windows on the lab machines</a:t>
+            </a:r>
+          </a:p>
+          <a:p>
+            <a:pPr lvl="1"/>
+            <a:r>
+              <a:rPr lang="en-US" dirty="0" smtClean="0"/>
+              <a:t>Seriously, what the fuck is going on</a:t>
+            </a:r>
+            <a:endParaRPr lang="en-US" dirty="0"/>
           </a:p>
         </p:txBody>
       </p:sp>
@@ -7295,7 +7271,7 @@
     </p:spTree>
     <p:extLst>
       <p:ext uri="{BB962C8B-B14F-4D97-AF65-F5344CB8AC3E}">
-        <p14:creationId xmlns:p14="http://schemas.microsoft.com/office/powerpoint/2010/main" val="927351193"/>
+        <p14:creationId xmlns:p14="http://schemas.microsoft.com/office/powerpoint/2010/main" val="3004513485"/>
       </p:ext>
     </p:extLst>
   </p:cSld>
@@ -7526,7 +7502,7 @@
           <a:p>
             <a:r>
               <a:rPr lang="en-US" dirty="0" smtClean="0"/>
-              <a:t>Negative Feedback</a:t>
+              <a:t>Conclusions</a:t>
             </a:r>
             <a:endParaRPr lang="en-US" dirty="0"/>
           </a:p>
@@ -7544,41 +7520,75 @@
         </p:nvSpPr>
         <p:spPr>
           <a:xfrm>
-            <a:off x="739775" y="2807164"/>
-            <a:ext cx="7662864" cy="3267169"/>
+            <a:off x="739775" y="2088292"/>
+            <a:ext cx="7662864" cy="3948972"/>
           </a:xfrm>
         </p:spPr>
         <p:txBody>
-          <a:bodyPr/>
-          <a:lstStyle/>
-          <a:p>
-            <a:r>
-              <a:rPr lang="en-US" dirty="0" smtClean="0"/>
-              <a:t>Too many lab handouts/presentations</a:t>
-            </a:r>
-          </a:p>
-          <a:p>
-            <a:r>
-              <a:rPr lang="en-US" dirty="0" smtClean="0"/>
-              <a:t>Sound lab is ridiculously difficult unless you find Team </a:t>
-            </a:r>
+          <a:bodyPr>
+            <a:normAutofit/>
+          </a:bodyPr>
+          <a:lstStyle/>
+          <a:p>
             <a:r>
               <a:rPr lang="en-US" dirty="0" err="1" smtClean="0"/>
-              <a:t>Dragonforce’s</a:t>
-            </a:r>
-            <a:r>
-              <a:rPr lang="en-US" dirty="0" smtClean="0"/>
-              <a:t> code</a:t>
-            </a:r>
-          </a:p>
-          <a:p>
-            <a:r>
-              <a:rPr lang="en-US" dirty="0" smtClean="0"/>
-              <a:t>Virtex-7 is useless for video/sound</a:t>
-            </a:r>
-          </a:p>
-          <a:p>
-            <a:endParaRPr lang="en-US" dirty="0"/>
+              <a:t>ChipScope</a:t>
+            </a:r>
+            <a:r>
+              <a:rPr lang="en-US" dirty="0" smtClean="0"/>
+              <a:t>, you are our only hope</a:t>
+            </a:r>
+          </a:p>
+          <a:p>
+            <a:r>
+              <a:rPr lang="en-US" dirty="0" smtClean="0"/>
+              <a:t>Don’t take 18-349</a:t>
+            </a:r>
+          </a:p>
+          <a:p>
+            <a:pPr lvl="1"/>
+            <a:r>
+              <a:rPr lang="en-US" dirty="0"/>
+              <a:t>Ever</a:t>
+            </a:r>
+          </a:p>
+          <a:p>
+            <a:pPr lvl="1"/>
+            <a:r>
+              <a:rPr lang="en-US" dirty="0"/>
+              <a:t>For any reason</a:t>
+            </a:r>
+          </a:p>
+          <a:p>
+            <a:r>
+              <a:rPr lang="en-US" dirty="0" smtClean="0"/>
+              <a:t>The Virtex-7-based VC707 is not a good board for this class</a:t>
+            </a:r>
+          </a:p>
+          <a:p>
+            <a:pPr lvl="1"/>
+            <a:r>
+              <a:rPr lang="en-US" dirty="0" smtClean="0"/>
+              <a:t>Until someone writes a </a:t>
+            </a:r>
+            <a:r>
+              <a:rPr lang="en-US" dirty="0" err="1" smtClean="0"/>
+              <a:t>SystemVerilog</a:t>
+            </a:r>
+            <a:r>
+              <a:rPr lang="en-US" dirty="0" smtClean="0"/>
+              <a:t> HDMI driver</a:t>
+            </a:r>
+          </a:p>
+          <a:p>
+            <a:pPr lvl="1"/>
+            <a:r>
+              <a:rPr lang="en-US" dirty="0" smtClean="0"/>
+              <a:t>Or buys an expansion board with GPIO, VGA, and an AC97 chip</a:t>
+            </a:r>
+          </a:p>
+          <a:p>
+            <a:endParaRPr lang="en-US" dirty="0" smtClean="0"/>
           </a:p>
         </p:txBody>
       </p:sp>
@@ -7608,7 +7618,7 @@
     </p:spTree>
     <p:extLst>
       <p:ext uri="{BB962C8B-B14F-4D97-AF65-F5344CB8AC3E}">
-        <p14:creationId xmlns:p14="http://schemas.microsoft.com/office/powerpoint/2010/main" val="1147638843"/>
+        <p14:creationId xmlns:p14="http://schemas.microsoft.com/office/powerpoint/2010/main" val="927351193"/>
       </p:ext>
     </p:extLst>
   </p:cSld>
@@ -7652,7 +7662,7 @@
           <a:p>
             <a:r>
               <a:rPr lang="en-US" dirty="0" smtClean="0"/>
-              <a:t>Positive Feedback</a:t>
+              <a:t>Negative Feedback</a:t>
             </a:r>
             <a:endParaRPr lang="en-US" dirty="0"/>
           </a:p>
@@ -7668,66 +7678,48 @@
             <p:ph idx="1"/>
           </p:nvPr>
         </p:nvSpPr>
-        <p:spPr/>
-        <p:txBody>
-          <a:bodyPr/>
-          <a:lstStyle/>
-          <a:p>
-            <a:r>
-              <a:rPr lang="en-US" dirty="0" smtClean="0"/>
-              <a:t>Self-driven course</a:t>
-            </a:r>
-          </a:p>
-          <a:p>
-            <a:r>
-              <a:rPr lang="en-US" dirty="0" smtClean="0"/>
-              <a:t>Learn about interfacing with other people’s designs</a:t>
-            </a:r>
-          </a:p>
-          <a:p>
-            <a:pPr lvl="1"/>
-            <a:r>
-              <a:rPr lang="en-US" dirty="0"/>
-              <a:t>AC97, </a:t>
-            </a:r>
-            <a:r>
-              <a:rPr lang="en-US" dirty="0" err="1"/>
-              <a:t>Chrontel</a:t>
-            </a:r>
-            <a:r>
-              <a:rPr lang="en-US" dirty="0"/>
-              <a:t> DVI, Flash, Xilinx </a:t>
-            </a:r>
-            <a:r>
-              <a:rPr lang="en-US" dirty="0" err="1"/>
-              <a:t>ChipScope</a:t>
-            </a:r>
-            <a:r>
-              <a:rPr lang="en-US" dirty="0"/>
-              <a:t>/</a:t>
-            </a:r>
-            <a:r>
-              <a:rPr lang="en-US" dirty="0" err="1"/>
-              <a:t>BlockRAM</a:t>
-            </a:r>
+        <p:spPr>
+          <a:xfrm>
+            <a:off x="739775" y="2807164"/>
+            <a:ext cx="7662864" cy="3267169"/>
+          </a:xfrm>
+        </p:spPr>
+        <p:txBody>
+          <a:bodyPr/>
+          <a:lstStyle/>
+          <a:p>
+            <a:r>
+              <a:rPr lang="en-US" dirty="0" smtClean="0"/>
+              <a:t>Too many lab handouts/presentations</a:t>
+            </a:r>
+          </a:p>
+          <a:p>
+            <a:r>
+              <a:rPr lang="en-US" dirty="0" smtClean="0"/>
+              <a:t>Sound lab is ridiculously difficult unless you find Team </a:t>
+            </a:r>
+            <a:r>
+              <a:rPr lang="en-US" dirty="0" err="1" smtClean="0"/>
+              <a:t>Dragonforce’s</a:t>
+            </a:r>
+            <a:r>
+              <a:rPr lang="en-US" dirty="0" smtClean="0"/>
+              <a:t> </a:t>
+            </a:r>
+            <a:r>
+              <a:rPr lang="en-US" dirty="0" smtClean="0"/>
+              <a:t>code</a:t>
+            </a:r>
+            <a:endParaRPr lang="en-US" dirty="0" smtClean="0"/>
+          </a:p>
+          <a:p>
+            <a:r>
+              <a:rPr lang="en-US" dirty="0" smtClean="0"/>
+              <a:t>Virtex-7 is useless for video/sound</a:t>
+            </a:r>
+          </a:p>
+          <a:p>
             <a:endParaRPr lang="en-US" dirty="0"/>
-          </a:p>
-          <a:p>
-            <a:pPr lvl="1"/>
-            <a:r>
-              <a:rPr lang="en-US" dirty="0"/>
-              <a:t>Cartridge, </a:t>
-            </a:r>
-            <a:r>
-              <a:rPr lang="en-US" dirty="0" smtClean="0"/>
-              <a:t>controller</a:t>
-            </a:r>
-          </a:p>
-          <a:p>
-            <a:r>
-              <a:rPr lang="en-US" dirty="0" smtClean="0"/>
-              <a:t>Testing, testing, testing</a:t>
-            </a:r>
           </a:p>
         </p:txBody>
       </p:sp>
@@ -7757,7 +7749,7 @@
     </p:spTree>
     <p:extLst>
       <p:ext uri="{BB962C8B-B14F-4D97-AF65-F5344CB8AC3E}">
-        <p14:creationId xmlns:p14="http://schemas.microsoft.com/office/powerpoint/2010/main" val="100683011"/>
+        <p14:creationId xmlns:p14="http://schemas.microsoft.com/office/powerpoint/2010/main" val="1147638843"/>
       </p:ext>
     </p:extLst>
   </p:cSld>
@@ -7800,6 +7792,155 @@
           <a:lstStyle/>
           <a:p>
             <a:r>
+              <a:rPr lang="en-US" dirty="0" smtClean="0"/>
+              <a:t>Positive Feedback</a:t>
+            </a:r>
+            <a:endParaRPr lang="en-US" dirty="0"/>
+          </a:p>
+        </p:txBody>
+      </p:sp>
+      <p:sp>
+        <p:nvSpPr>
+          <p:cNvPr id="3" name="Content Placeholder 2"/>
+          <p:cNvSpPr>
+            <a:spLocks noGrp="1"/>
+          </p:cNvSpPr>
+          <p:nvPr>
+            <p:ph idx="1"/>
+          </p:nvPr>
+        </p:nvSpPr>
+        <p:spPr/>
+        <p:txBody>
+          <a:bodyPr/>
+          <a:lstStyle/>
+          <a:p>
+            <a:r>
+              <a:rPr lang="en-US" dirty="0" smtClean="0"/>
+              <a:t>Self-driven course</a:t>
+            </a:r>
+          </a:p>
+          <a:p>
+            <a:r>
+              <a:rPr lang="en-US" dirty="0" smtClean="0"/>
+              <a:t>Learn about interfacing with other people’s designs</a:t>
+            </a:r>
+          </a:p>
+          <a:p>
+            <a:pPr lvl="1"/>
+            <a:r>
+              <a:rPr lang="en-US" dirty="0"/>
+              <a:t>AC97, </a:t>
+            </a:r>
+            <a:r>
+              <a:rPr lang="en-US" dirty="0" err="1"/>
+              <a:t>Chrontel</a:t>
+            </a:r>
+            <a:r>
+              <a:rPr lang="en-US" dirty="0"/>
+              <a:t> DVI, Flash, Xilinx </a:t>
+            </a:r>
+            <a:r>
+              <a:rPr lang="en-US" dirty="0" err="1"/>
+              <a:t>ChipScope</a:t>
+            </a:r>
+            <a:r>
+              <a:rPr lang="en-US" dirty="0"/>
+              <a:t>/</a:t>
+            </a:r>
+            <a:r>
+              <a:rPr lang="en-US" dirty="0" err="1"/>
+              <a:t>BlockRAM</a:t>
+            </a:r>
+            <a:endParaRPr lang="en-US" dirty="0"/>
+          </a:p>
+          <a:p>
+            <a:pPr lvl="1"/>
+            <a:r>
+              <a:rPr lang="en-US" dirty="0"/>
+              <a:t>Cartridge, </a:t>
+            </a:r>
+            <a:r>
+              <a:rPr lang="en-US" dirty="0" smtClean="0"/>
+              <a:t>controller</a:t>
+            </a:r>
+          </a:p>
+          <a:p>
+            <a:r>
+              <a:rPr lang="en-US" dirty="0" smtClean="0"/>
+              <a:t>Testing, testing, testing</a:t>
+            </a:r>
+          </a:p>
+        </p:txBody>
+      </p:sp>
+      <p:sp>
+        <p:nvSpPr>
+          <p:cNvPr id="4" name="Slide Number Placeholder 3"/>
+          <p:cNvSpPr>
+            <a:spLocks noGrp="1"/>
+          </p:cNvSpPr>
+          <p:nvPr>
+            <p:ph type="sldNum" sz="quarter" idx="12"/>
+          </p:nvPr>
+        </p:nvSpPr>
+        <p:spPr/>
+        <p:txBody>
+          <a:bodyPr/>
+          <a:lstStyle/>
+          <a:p>
+            <a:fld id="{9F2F5E10-5301-4EE6-90D2-A6C4A3F62BED}" type="slidenum">
+              <a:rPr lang="en-US" smtClean="0"/>
+              <a:t>22</a:t>
+            </a:fld>
+            <a:endParaRPr lang="en-US"/>
+          </a:p>
+        </p:txBody>
+      </p:sp>
+    </p:spTree>
+    <p:extLst>
+      <p:ext uri="{BB962C8B-B14F-4D97-AF65-F5344CB8AC3E}">
+        <p14:creationId xmlns:p14="http://schemas.microsoft.com/office/powerpoint/2010/main" val="100683011"/>
+      </p:ext>
+    </p:extLst>
+  </p:cSld>
+  <p:clrMapOvr>
+    <a:masterClrMapping/>
+  </p:clrMapOvr>
+</p:sld>
+</file>
+
+<file path=ppt/slides/slide23.xml><?xml version="1.0" encoding="utf-8"?>
+<p:sld xmlns:a="http://schemas.openxmlformats.org/drawingml/2006/main" xmlns:r="http://schemas.openxmlformats.org/officeDocument/2006/relationships" xmlns:p="http://schemas.openxmlformats.org/presentationml/2006/main">
+  <p:cSld>
+    <p:spTree>
+      <p:nvGrpSpPr>
+        <p:cNvPr id="1" name=""/>
+        <p:cNvGrpSpPr/>
+        <p:nvPr/>
+      </p:nvGrpSpPr>
+      <p:grpSpPr>
+        <a:xfrm>
+          <a:off x="0" y="0"/>
+          <a:ext cx="0" cy="0"/>
+          <a:chOff x="0" y="0"/>
+          <a:chExt cx="0" cy="0"/>
+        </a:xfrm>
+      </p:grpSpPr>
+      <p:sp>
+        <p:nvSpPr>
+          <p:cNvPr id="2" name="Title 1"/>
+          <p:cNvSpPr>
+            <a:spLocks noGrp="1"/>
+          </p:cNvSpPr>
+          <p:nvPr>
+            <p:ph type="title"/>
+          </p:nvPr>
+        </p:nvSpPr>
+        <p:spPr/>
+        <p:txBody>
+          <a:bodyPr/>
+          <a:lstStyle/>
+          <a:p>
+            <a:r>
               <a:rPr lang="en-US" smtClean="0"/>
               <a:t>Comments/Questions</a:t>
             </a:r>
@@ -7847,7 +7988,7 @@
           <a:p>
             <a:fld id="{9F2F5E10-5301-4EE6-90D2-A6C4A3F62BED}" type="slidenum">
               <a:rPr lang="en-US" smtClean="0"/>
-              <a:t>22</a:t>
+              <a:t>23</a:t>
             </a:fld>
             <a:endParaRPr lang="en-US"/>
           </a:p>
@@ -8263,7 +8404,6 @@
               <a:rPr lang="en-US" dirty="0" smtClean="0"/>
               <a:t>Xilinx sucks</a:t>
             </a:r>
-            <a:endParaRPr lang="en-US" dirty="0" smtClean="0"/>
           </a:p>
         </p:txBody>
       </p:sp>

</xml_diff>

<commit_message>
fixed the stupid fucking diagram god damn it
</commit_message>
<xml_diff>
--- a/Meerkats_Presentation.pptx
+++ b/Meerkats_Presentation.pptx
@@ -215,7 +215,7 @@
           <a:p>
             <a:fld id="{DE4E0638-58FF-8B48-927A-E1AD2675C4BB}" type="datetimeFigureOut">
               <a:rPr lang="en-US" smtClean="0"/>
-              <a:t>12/1/13</a:t>
+              <a:t>12/1/2013</a:t>
             </a:fld>
             <a:endParaRPr lang="en-US"/>
           </a:p>
@@ -381,7 +381,7 @@
           <a:p>
             <a:fld id="{76915D90-42E3-B247-AD70-F810019CF458}" type="datetimeFigureOut">
               <a:rPr lang="en-US" smtClean="0"/>
-              <a:t>12/1/13</a:t>
+              <a:t>12/1/2013</a:t>
             </a:fld>
             <a:endParaRPr lang="en-US"/>
           </a:p>
@@ -930,7 +930,7 @@
           <a:p>
             <a:fld id="{5F3AC8FA-59E5-644A-9E47-2D5BEB871836}" type="datetime1">
               <a:rPr lang="en-US" smtClean="0"/>
-              <a:t>12/1/13</a:t>
+              <a:t>12/1/2013</a:t>
             </a:fld>
             <a:endParaRPr lang="en-US"/>
           </a:p>
@@ -1059,7 +1059,7 @@
           <a:p>
             <a:fld id="{AE2E521C-9A0D-5240-8B8C-D1EB8916D335}" type="datetime1">
               <a:rPr lang="en-US" smtClean="0"/>
-              <a:t>12/1/13</a:t>
+              <a:t>12/1/2013</a:t>
             </a:fld>
             <a:endParaRPr lang="en-US"/>
           </a:p>
@@ -1364,7 +1364,7 @@
           <a:p>
             <a:fld id="{3F6F6E47-9050-1148-BF20-3E4D1A303218}" type="datetime1">
               <a:rPr lang="en-US" smtClean="0"/>
-              <a:t>12/1/13</a:t>
+              <a:t>12/1/2013</a:t>
             </a:fld>
             <a:endParaRPr lang="en-US"/>
           </a:p>
@@ -1589,7 +1589,7 @@
           <a:p>
             <a:fld id="{94139C60-2FF3-FA4B-A5C8-1638814C5B85}" type="datetime1">
               <a:rPr lang="en-US" smtClean="0"/>
-              <a:t>12/1/13</a:t>
+              <a:t>12/1/2013</a:t>
             </a:fld>
             <a:endParaRPr lang="en-US"/>
           </a:p>
@@ -1859,7 +1859,7 @@
           <a:p>
             <a:fld id="{532D4034-0A83-0D40-8614-515D57EB914E}" type="datetime1">
               <a:rPr lang="en-US" smtClean="0"/>
-              <a:t>12/1/13</a:t>
+              <a:t>12/1/2013</a:t>
             </a:fld>
             <a:endParaRPr lang="en-US"/>
           </a:p>
@@ -2184,7 +2184,7 @@
           <a:p>
             <a:fld id="{389C2F24-7E9D-BC4F-BC5F-1D3EC9EDEC1B}" type="datetime1">
               <a:rPr lang="en-US" smtClean="0"/>
-              <a:t>12/1/13</a:t>
+              <a:t>12/1/2013</a:t>
             </a:fld>
             <a:endParaRPr lang="en-US"/>
           </a:p>
@@ -2377,7 +2377,7 @@
           <a:p>
             <a:fld id="{A8089BF9-1661-DF4D-A918-B02341DD113A}" type="datetime1">
               <a:rPr lang="en-US" smtClean="0"/>
-              <a:t>12/1/13</a:t>
+              <a:t>12/1/2013</a:t>
             </a:fld>
             <a:endParaRPr lang="en-US"/>
           </a:p>
@@ -2481,7 +2481,7 @@
           <a:p>
             <a:fld id="{203BFD71-C301-134C-9C45-27EC548CF349}" type="datetime1">
               <a:rPr lang="en-US" smtClean="0"/>
-              <a:t>12/1/13</a:t>
+              <a:t>12/1/2013</a:t>
             </a:fld>
             <a:endParaRPr lang="en-US"/>
           </a:p>
@@ -2650,7 +2650,7 @@
           <a:p>
             <a:fld id="{2CB6E849-E76A-D449-A662-9DA371523A08}" type="datetime1">
               <a:rPr lang="en-US" smtClean="0"/>
-              <a:t>12/1/13</a:t>
+              <a:t>12/1/2013</a:t>
             </a:fld>
             <a:endParaRPr lang="en-US"/>
           </a:p>
@@ -2914,7 +2914,7 @@
           <a:p>
             <a:fld id="{4DADB9FD-7CCB-9A44-9D30-949A52DC4346}" type="datetime1">
               <a:rPr lang="en-US" smtClean="0"/>
-              <a:t>12/1/13</a:t>
+              <a:t>12/1/2013</a:t>
             </a:fld>
             <a:endParaRPr lang="en-US"/>
           </a:p>
@@ -3248,7 +3248,7 @@
           <a:p>
             <a:fld id="{6B2D70F2-B915-8A49-9C7D-8B46F2CF7D17}" type="datetime1">
               <a:rPr lang="en-US" smtClean="0"/>
-              <a:t>12/1/13</a:t>
+              <a:t>12/1/2013</a:t>
             </a:fld>
             <a:endParaRPr lang="en-US"/>
           </a:p>
@@ -3689,7 +3689,7 @@
           <a:p>
             <a:fld id="{B8D7E65C-CBE5-D14A-80B6-F0FD54CBB233}" type="datetime1">
               <a:rPr lang="en-US" smtClean="0"/>
-              <a:t>12/1/13</a:t>
+              <a:t>12/1/2013</a:t>
             </a:fld>
             <a:endParaRPr lang="en-US"/>
           </a:p>
@@ -3887,7 +3887,7 @@
           <a:p>
             <a:fld id="{BA1B2A8D-3EE6-6D42-9AD1-77F137BCFA1B}" type="datetime1">
               <a:rPr lang="en-US" smtClean="0"/>
-              <a:t>12/1/13</a:t>
+              <a:t>12/1/2013</a:t>
             </a:fld>
             <a:endParaRPr lang="en-US"/>
           </a:p>
@@ -4170,7 +4170,7 @@
           <a:p>
             <a:fld id="{0D54D886-D6CD-3A41-AE78-3523F6051162}" type="datetime1">
               <a:rPr lang="en-US" smtClean="0"/>
-              <a:t>12/1/13</a:t>
+              <a:t>12/1/2013</a:t>
             </a:fld>
             <a:endParaRPr lang="en-US"/>
           </a:p>
@@ -4538,7 +4538,7 @@
           <a:p>
             <a:fld id="{C93D052F-6C95-B442-BBF7-719656E80BD9}" type="datetime1">
               <a:rPr lang="en-US" smtClean="0"/>
-              <a:t>12/1/13</a:t>
+              <a:t>12/1/2013</a:t>
             </a:fld>
             <a:endParaRPr lang="en-US"/>
           </a:p>
@@ -5034,7 +5034,7 @@
           <a:p>
             <a:fld id="{33E4B11F-DC24-BF43-BFE9-5D333D8CE8B9}" type="datetime1">
               <a:rPr lang="en-US" smtClean="0"/>
-              <a:t>12/1/13</a:t>
+              <a:t>12/1/2013</a:t>
             </a:fld>
             <a:endParaRPr lang="en-US"/>
           </a:p>
@@ -5243,7 +5243,7 @@
           <a:p>
             <a:fld id="{AB7EA7DD-FAE8-1846-80D1-2CBCB864AE06}" type="datetime1">
               <a:rPr lang="en-US" smtClean="0"/>
-              <a:t>12/1/13</a:t>
+              <a:t>12/1/2013</a:t>
             </a:fld>
             <a:endParaRPr lang="en-US"/>
           </a:p>
@@ -5740,11 +5740,7 @@
           <a:p>
             <a:r>
               <a:rPr lang="en-US" dirty="0" smtClean="0"/>
-              <a:t>Present the </a:t>
-            </a:r>
-            <a:r>
-              <a:rPr lang="en-US" dirty="0" smtClean="0"/>
-              <a:t>Gameboy!</a:t>
+              <a:t>Present the Gameboy!</a:t>
             </a:r>
             <a:endParaRPr lang="en-US" dirty="0"/>
           </a:p>
@@ -5782,7 +5778,7 @@
   <p:timing>
     <p:tnLst>
       <p:par>
-        <p:cTn xmlns:p14="http://schemas.microsoft.com/office/powerpoint/2010/main" id="1" dur="indefinite" restart="never" nodeType="tmRoot"/>
+        <p:cTn id="1" dur="indefinite" restart="never" nodeType="tmRoot"/>
       </p:par>
     </p:tnLst>
   </p:timing>
@@ -5925,7 +5921,7 @@
   <p:timing>
     <p:tnLst>
       <p:par>
-        <p:cTn xmlns:p14="http://schemas.microsoft.com/office/powerpoint/2010/main" id="1" dur="indefinite" restart="never" nodeType="tmRoot"/>
+        <p:cTn id="1" dur="indefinite" restart="never" nodeType="tmRoot"/>
       </p:par>
     </p:tnLst>
   </p:timing>
@@ -6024,7 +6020,6 @@
               <a:rPr lang="en-US" dirty="0" smtClean="0"/>
               <a:t>Only necessary for larger games</a:t>
             </a:r>
-            <a:endParaRPr lang="en-US" dirty="0" smtClean="0"/>
           </a:p>
         </p:txBody>
       </p:sp>
@@ -6064,7 +6059,7 @@
   <p:timing>
     <p:tnLst>
       <p:par>
-        <p:cTn xmlns:p14="http://schemas.microsoft.com/office/powerpoint/2010/main" id="1" dur="indefinite" restart="never" nodeType="tmRoot"/>
+        <p:cTn id="1" dur="indefinite" restart="never" nodeType="tmRoot"/>
       </p:par>
     </p:tnLst>
   </p:timing>
@@ -6262,7 +6257,7 @@
         <p:spPr/>
         <p:txBody>
           <a:bodyPr>
-            <a:normAutofit lnSpcReduction="10000"/>
+            <a:normAutofit fontScale="92500"/>
           </a:bodyPr>
           <a:lstStyle/>
           <a:p>
@@ -6362,7 +6357,7 @@
   <p:timing>
     <p:tnLst>
       <p:par>
-        <p:cTn xmlns:p14="http://schemas.microsoft.com/office/powerpoint/2010/main" id="1" dur="indefinite" restart="never" nodeType="tmRoot"/>
+        <p:cTn id="1" dur="indefinite" restart="never" nodeType="tmRoot"/>
       </p:par>
     </p:tnLst>
   </p:timing>
@@ -6442,7 +6437,6 @@
               <a:rPr lang="en-US" dirty="0" smtClean="0"/>
               <a:t>Working to debug</a:t>
             </a:r>
-            <a:endParaRPr lang="en-US" dirty="0" smtClean="0"/>
           </a:p>
           <a:p>
             <a:r>
@@ -6456,7 +6450,6 @@
               <a:rPr lang="en-US" dirty="0" smtClean="0"/>
               <a:t>Time crunch and all that… You know.</a:t>
             </a:r>
-            <a:endParaRPr lang="en-US" dirty="0" smtClean="0"/>
           </a:p>
           <a:p>
             <a:r>
@@ -6563,7 +6556,7 @@
   <p:timing>
     <p:tnLst>
       <p:par>
-        <p:cTn xmlns:p14="http://schemas.microsoft.com/office/powerpoint/2010/main" id="1" dur="indefinite" restart="never" nodeType="tmRoot"/>
+        <p:cTn id="1" dur="indefinite" restart="never" nodeType="tmRoot"/>
       </p:par>
     </p:tnLst>
   </p:timing>
@@ -6629,7 +6622,6 @@
               <a:rPr lang="en-US" dirty="0" smtClean="0"/>
               <a:t>We can’t really play Tetris quite yet</a:t>
             </a:r>
-            <a:endParaRPr lang="en-US" dirty="0" smtClean="0"/>
           </a:p>
           <a:p>
             <a:r>
@@ -6688,7 +6680,7 @@
   <p:timing>
     <p:tnLst>
       <p:par>
-        <p:cTn xmlns:p14="http://schemas.microsoft.com/office/powerpoint/2010/main" id="1" dur="indefinite" restart="never" nodeType="tmRoot"/>
+        <p:cTn id="1" dur="indefinite" restart="never" nodeType="tmRoot"/>
       </p:par>
     </p:tnLst>
   </p:timing>
@@ -6752,27 +6744,20 @@
           <a:p>
             <a:r>
               <a:rPr lang="en-US" dirty="0" smtClean="0"/>
-              <a:t>Wednesday: </a:t>
-            </a:r>
-            <a:r>
-              <a:rPr lang="en-US" dirty="0" smtClean="0"/>
-              <a:t>Gameplay!</a:t>
-            </a:r>
-            <a:endParaRPr lang="en-US" dirty="0" smtClean="0"/>
+              <a:t>Wednesday: Gameplay!</a:t>
+            </a:r>
           </a:p>
           <a:p>
             <a:r>
               <a:rPr lang="en-US" dirty="0" smtClean="0"/>
               <a:t>Thursday: Link cable?</a:t>
             </a:r>
-            <a:endParaRPr lang="en-US" dirty="0" smtClean="0"/>
           </a:p>
           <a:p>
             <a:r>
               <a:rPr lang="en-US" dirty="0" smtClean="0"/>
               <a:t>Friday: Other games??</a:t>
             </a:r>
-            <a:endParaRPr lang="en-US" dirty="0" smtClean="0"/>
           </a:p>
         </p:txBody>
       </p:sp>
@@ -7082,23 +7067,14 @@
             <a:pPr lvl="1"/>
             <a:r>
               <a:rPr lang="en-US" dirty="0" smtClean="0"/>
-              <a:t>Or buys an expansion board with GPIO, VGA, and an AC97 </a:t>
-            </a:r>
-            <a:r>
-              <a:rPr lang="en-US" dirty="0" smtClean="0"/>
-              <a:t>chip</a:t>
-            </a:r>
-          </a:p>
-          <a:p>
-            <a:r>
-              <a:rPr lang="en-US" dirty="0" smtClean="0"/>
-              <a:t>You will never have enough time. </a:t>
-            </a:r>
-            <a:r>
-              <a:rPr lang="en-US" dirty="0" smtClean="0"/>
-              <a:t>Don’t even pretend.</a:t>
-            </a:r>
-            <a:endParaRPr lang="en-US" dirty="0" smtClean="0"/>
+              <a:t>Or buys an expansion board with GPIO, VGA, and an AC97 chip</a:t>
+            </a:r>
+          </a:p>
+          <a:p>
+            <a:r>
+              <a:rPr lang="en-US" dirty="0" smtClean="0"/>
+              <a:t>You will never have enough time. Don’t even pretend.</a:t>
+            </a:r>
           </a:p>
           <a:p>
             <a:endParaRPr lang="en-US" dirty="0" smtClean="0"/>
@@ -7333,20 +7309,11 @@
               <a:rPr lang="en-US" dirty="0" smtClean="0"/>
               <a:t>Gameboy running Tetris (almost)</a:t>
             </a:r>
-            <a:endParaRPr lang="en-US" dirty="0" smtClean="0"/>
-          </a:p>
-          <a:p>
-            <a:r>
-              <a:rPr lang="en-US" dirty="0" smtClean="0"/>
-              <a:t>It’s not </a:t>
-            </a:r>
-            <a:r>
-              <a:rPr lang="en-US" dirty="0" smtClean="0"/>
-              <a:t>finished (</a:t>
-            </a:r>
-            <a:r>
-              <a:rPr lang="en-US" dirty="0" smtClean="0"/>
-              <a:t>but it’s still fun)!</a:t>
+          </a:p>
+          <a:p>
+            <a:r>
+              <a:rPr lang="en-US" dirty="0" smtClean="0"/>
+              <a:t>It’s not finished (but it’s still fun)!</a:t>
             </a:r>
           </a:p>
           <a:p>
@@ -7383,14 +7350,12 @@
               <a:rPr lang="en-US" dirty="0" smtClean="0"/>
               <a:t>Demo plays in fast motion!</a:t>
             </a:r>
-            <a:endParaRPr lang="en-US" dirty="0" smtClean="0"/>
           </a:p>
           <a:p>
             <a:r>
               <a:rPr lang="en-US" dirty="0" smtClean="0"/>
               <a:t>Just a little further to go!</a:t>
             </a:r>
-            <a:endParaRPr lang="en-US" dirty="0" smtClean="0"/>
           </a:p>
         </p:txBody>
       </p:sp>
@@ -7460,7 +7425,7 @@
   <p:timing>
     <p:tnLst>
       <p:par>
-        <p:cTn xmlns:p14="http://schemas.microsoft.com/office/powerpoint/2010/main" id="1" dur="indefinite" restart="never" nodeType="tmRoot"/>
+        <p:cTn id="1" dur="indefinite" restart="never" nodeType="tmRoot"/>
       </p:par>
     </p:tnLst>
   </p:timing>
@@ -7586,7 +7551,6 @@
               <a:rPr lang="en-US" dirty="0" smtClean="0"/>
               <a:t>Exciting to come into lab and work on something you love</a:t>
             </a:r>
-            <a:endParaRPr lang="en-US" dirty="0" smtClean="0"/>
           </a:p>
           <a:p>
             <a:r>
@@ -7731,7 +7695,7 @@
   <p:timing>
     <p:tnLst>
       <p:par>
-        <p:cTn xmlns:p14="http://schemas.microsoft.com/office/powerpoint/2010/main" id="1" dur="indefinite" restart="never" nodeType="tmRoot"/>
+        <p:cTn id="1" dur="indefinite" restart="never" nodeType="tmRoot"/>
       </p:par>
     </p:tnLst>
   </p:timing>
@@ -7778,9 +7742,32 @@
           </a:p>
         </p:txBody>
       </p:sp>
+      <p:sp>
+        <p:nvSpPr>
+          <p:cNvPr id="3" name="Slide Number Placeholder 2"/>
+          <p:cNvSpPr>
+            <a:spLocks noGrp="1"/>
+          </p:cNvSpPr>
+          <p:nvPr>
+            <p:ph type="sldNum" sz="quarter" idx="12"/>
+          </p:nvPr>
+        </p:nvSpPr>
+        <p:spPr/>
+        <p:txBody>
+          <a:bodyPr/>
+          <a:lstStyle/>
+          <a:p>
+            <a:fld id="{9F2F5E10-5301-4EE6-90D2-A6C4A3F62BED}" type="slidenum">
+              <a:rPr lang="en-US" smtClean="0"/>
+              <a:t>3</a:t>
+            </a:fld>
+            <a:endParaRPr lang="en-US"/>
+          </a:p>
+        </p:txBody>
+      </p:sp>
       <p:pic>
         <p:nvPicPr>
-          <p:cNvPr id="4" name="Picture 3"/>
+          <p:cNvPr id="5" name="Picture 4"/>
           <p:cNvPicPr>
             <a:picLocks noChangeAspect="1"/>
           </p:cNvPicPr>
@@ -7794,42 +7781,19 @@
               </a:ext>
             </a:extLst>
           </a:blip>
-          <a:srcRect l="6126" t="6325" r="12981" b="22041"/>
+          <a:srcRect r="11492" b="20901"/>
           <a:stretch/>
         </p:blipFill>
         <p:spPr>
           <a:xfrm>
-            <a:off x="803188" y="1401642"/>
-            <a:ext cx="7883612" cy="5394625"/>
+            <a:off x="464407" y="931734"/>
+            <a:ext cx="8748585" cy="6041564"/>
           </a:xfrm>
           <a:prstGeom prst="rect">
             <a:avLst/>
           </a:prstGeom>
         </p:spPr>
       </p:pic>
-      <p:sp>
-        <p:nvSpPr>
-          <p:cNvPr id="3" name="Slide Number Placeholder 2"/>
-          <p:cNvSpPr>
-            <a:spLocks noGrp="1"/>
-          </p:cNvSpPr>
-          <p:nvPr>
-            <p:ph type="sldNum" sz="quarter" idx="12"/>
-          </p:nvPr>
-        </p:nvSpPr>
-        <p:spPr/>
-        <p:txBody>
-          <a:bodyPr/>
-          <a:lstStyle/>
-          <a:p>
-            <a:fld id="{9F2F5E10-5301-4EE6-90D2-A6C4A3F62BED}" type="slidenum">
-              <a:rPr lang="en-US" smtClean="0"/>
-              <a:t>3</a:t>
-            </a:fld>
-            <a:endParaRPr lang="en-US"/>
-          </a:p>
-        </p:txBody>
-      </p:sp>
     </p:spTree>
     <p:extLst>
       <p:ext uri="{BB962C8B-B14F-4D97-AF65-F5344CB8AC3E}">
@@ -7843,7 +7807,7 @@
   <p:timing>
     <p:tnLst>
       <p:par>
-        <p:cTn xmlns:p14="http://schemas.microsoft.com/office/powerpoint/2010/main" id="1" dur="indefinite" restart="never" nodeType="tmRoot"/>
+        <p:cTn id="1" dur="indefinite" restart="never" nodeType="tmRoot"/>
       </p:par>
     </p:tnLst>
   </p:timing>
@@ -7998,7 +7962,7 @@
   <p:timing>
     <p:tnLst>
       <p:par>
-        <p:cTn xmlns:p14="http://schemas.microsoft.com/office/powerpoint/2010/main" id="1" dur="indefinite" restart="never" nodeType="tmRoot"/>
+        <p:cTn id="1" dur="indefinite" restart="never" nodeType="tmRoot"/>
       </p:par>
     </p:tnLst>
   </p:timing>
@@ -8162,7 +8126,7 @@
   <p:timing>
     <p:tnLst>
       <p:par>
-        <p:cTn xmlns:p14="http://schemas.microsoft.com/office/powerpoint/2010/main" id="1" dur="indefinite" restart="never" nodeType="tmRoot"/>
+        <p:cTn id="1" dur="indefinite" restart="never" nodeType="tmRoot"/>
       </p:par>
     </p:tnLst>
   </p:timing>
@@ -8312,7 +8276,7 @@
   <p:timing>
     <p:tnLst>
       <p:par>
-        <p:cTn xmlns:p14="http://schemas.microsoft.com/office/powerpoint/2010/main" id="1" dur="indefinite" restart="never" nodeType="tmRoot"/>
+        <p:cTn id="1" dur="indefinite" restart="never" nodeType="tmRoot"/>
       </p:par>
     </p:tnLst>
   </p:timing>
@@ -8377,7 +8341,7 @@
         </p:spPr>
         <p:txBody>
           <a:bodyPr>
-            <a:normAutofit/>
+            <a:normAutofit lnSpcReduction="10000"/>
           </a:bodyPr>
           <a:lstStyle/>
           <a:p>
@@ -8501,7 +8465,7 @@
   <p:timing>
     <p:tnLst>
       <p:par>
-        <p:cTn xmlns:p14="http://schemas.microsoft.com/office/powerpoint/2010/main" id="1" dur="indefinite" restart="never" nodeType="tmRoot"/>
+        <p:cTn id="1" dur="indefinite" restart="never" nodeType="tmRoot"/>
       </p:par>
     </p:tnLst>
   </p:timing>
@@ -8604,15 +8568,7 @@
             <a:pPr lvl="1"/>
             <a:r>
               <a:rPr lang="en-US" dirty="0" smtClean="0"/>
-              <a:t>Amplitude </a:t>
-            </a:r>
-            <a:r>
-              <a:rPr lang="en-US" dirty="0" smtClean="0"/>
-              <a:t>control using rotary </a:t>
-            </a:r>
-            <a:r>
-              <a:rPr lang="en-US" dirty="0" smtClean="0"/>
-              <a:t>controller</a:t>
+              <a:t>Amplitude control using rotary controller</a:t>
             </a:r>
           </a:p>
           <a:p>
@@ -8621,7 +8577,6 @@
               <a:rPr lang="en-US" dirty="0" smtClean="0"/>
               <a:t>18 memory-mapped registers for CPU communication</a:t>
             </a:r>
-            <a:endParaRPr lang="en-US" dirty="0" smtClean="0"/>
           </a:p>
           <a:p>
             <a:endParaRPr lang="en-US" dirty="0"/>
@@ -8664,7 +8619,7 @@
   <p:timing>
     <p:tnLst>
       <p:par>
-        <p:cTn xmlns:p14="http://schemas.microsoft.com/office/powerpoint/2010/main" id="1" dur="indefinite" restart="never" nodeType="tmRoot"/>
+        <p:cTn id="1" dur="indefinite" restart="never" nodeType="tmRoot"/>
       </p:par>
     </p:tnLst>
   </p:timing>
@@ -8804,7 +8759,7 @@
   <p:timing>
     <p:tnLst>
       <p:par>
-        <p:cTn xmlns:p14="http://schemas.microsoft.com/office/powerpoint/2010/main" id="1" dur="indefinite" restart="never" nodeType="tmRoot"/>
+        <p:cTn id="1" dur="indefinite" restart="never" nodeType="tmRoot"/>
       </p:par>
     </p:tnLst>
   </p:timing>

</xml_diff>

<commit_message>
Added changes for video portion of powerpoint.
</commit_message>
<xml_diff>
--- a/Meerkats_Presentation.pptx
+++ b/Meerkats_Presentation.pptx
@@ -215,7 +215,7 @@
           <a:p>
             <a:fld id="{DE4E0638-58FF-8B48-927A-E1AD2675C4BB}" type="datetimeFigureOut">
               <a:rPr lang="en-US" smtClean="0"/>
-              <a:t>12/1/13</a:t>
+              <a:t>12/1/2013</a:t>
             </a:fld>
             <a:endParaRPr lang="en-US"/>
           </a:p>
@@ -381,7 +381,7 @@
           <a:p>
             <a:fld id="{76915D90-42E3-B247-AD70-F810019CF458}" type="datetimeFigureOut">
               <a:rPr lang="en-US" smtClean="0"/>
-              <a:t>12/1/13</a:t>
+              <a:t>12/1/2013</a:t>
             </a:fld>
             <a:endParaRPr lang="en-US"/>
           </a:p>
@@ -930,7 +930,7 @@
           <a:p>
             <a:fld id="{5F3AC8FA-59E5-644A-9E47-2D5BEB871836}" type="datetime1">
               <a:rPr lang="en-US" smtClean="0"/>
-              <a:t>12/1/13</a:t>
+              <a:t>12/1/2013</a:t>
             </a:fld>
             <a:endParaRPr lang="en-US"/>
           </a:p>
@@ -1059,7 +1059,7 @@
           <a:p>
             <a:fld id="{AE2E521C-9A0D-5240-8B8C-D1EB8916D335}" type="datetime1">
               <a:rPr lang="en-US" smtClean="0"/>
-              <a:t>12/1/13</a:t>
+              <a:t>12/1/2013</a:t>
             </a:fld>
             <a:endParaRPr lang="en-US"/>
           </a:p>
@@ -1364,7 +1364,7 @@
           <a:p>
             <a:fld id="{3F6F6E47-9050-1148-BF20-3E4D1A303218}" type="datetime1">
               <a:rPr lang="en-US" smtClean="0"/>
-              <a:t>12/1/13</a:t>
+              <a:t>12/1/2013</a:t>
             </a:fld>
             <a:endParaRPr lang="en-US"/>
           </a:p>
@@ -1589,7 +1589,7 @@
           <a:p>
             <a:fld id="{94139C60-2FF3-FA4B-A5C8-1638814C5B85}" type="datetime1">
               <a:rPr lang="en-US" smtClean="0"/>
-              <a:t>12/1/13</a:t>
+              <a:t>12/1/2013</a:t>
             </a:fld>
             <a:endParaRPr lang="en-US"/>
           </a:p>
@@ -1859,7 +1859,7 @@
           <a:p>
             <a:fld id="{532D4034-0A83-0D40-8614-515D57EB914E}" type="datetime1">
               <a:rPr lang="en-US" smtClean="0"/>
-              <a:t>12/1/13</a:t>
+              <a:t>12/1/2013</a:t>
             </a:fld>
             <a:endParaRPr lang="en-US"/>
           </a:p>
@@ -2184,7 +2184,7 @@
           <a:p>
             <a:fld id="{389C2F24-7E9D-BC4F-BC5F-1D3EC9EDEC1B}" type="datetime1">
               <a:rPr lang="en-US" smtClean="0"/>
-              <a:t>12/1/13</a:t>
+              <a:t>12/1/2013</a:t>
             </a:fld>
             <a:endParaRPr lang="en-US"/>
           </a:p>
@@ -2377,7 +2377,7 @@
           <a:p>
             <a:fld id="{A8089BF9-1661-DF4D-A918-B02341DD113A}" type="datetime1">
               <a:rPr lang="en-US" smtClean="0"/>
-              <a:t>12/1/13</a:t>
+              <a:t>12/1/2013</a:t>
             </a:fld>
             <a:endParaRPr lang="en-US"/>
           </a:p>
@@ -2481,7 +2481,7 @@
           <a:p>
             <a:fld id="{203BFD71-C301-134C-9C45-27EC548CF349}" type="datetime1">
               <a:rPr lang="en-US" smtClean="0"/>
-              <a:t>12/1/13</a:t>
+              <a:t>12/1/2013</a:t>
             </a:fld>
             <a:endParaRPr lang="en-US"/>
           </a:p>
@@ -2650,7 +2650,7 @@
           <a:p>
             <a:fld id="{2CB6E849-E76A-D449-A662-9DA371523A08}" type="datetime1">
               <a:rPr lang="en-US" smtClean="0"/>
-              <a:t>12/1/13</a:t>
+              <a:t>12/1/2013</a:t>
             </a:fld>
             <a:endParaRPr lang="en-US"/>
           </a:p>
@@ -2914,7 +2914,7 @@
           <a:p>
             <a:fld id="{4DADB9FD-7CCB-9A44-9D30-949A52DC4346}" type="datetime1">
               <a:rPr lang="en-US" smtClean="0"/>
-              <a:t>12/1/13</a:t>
+              <a:t>12/1/2013</a:t>
             </a:fld>
             <a:endParaRPr lang="en-US"/>
           </a:p>
@@ -3248,7 +3248,7 @@
           <a:p>
             <a:fld id="{6B2D70F2-B915-8A49-9C7D-8B46F2CF7D17}" type="datetime1">
               <a:rPr lang="en-US" smtClean="0"/>
-              <a:t>12/1/13</a:t>
+              <a:t>12/1/2013</a:t>
             </a:fld>
             <a:endParaRPr lang="en-US"/>
           </a:p>
@@ -3689,7 +3689,7 @@
           <a:p>
             <a:fld id="{B8D7E65C-CBE5-D14A-80B6-F0FD54CBB233}" type="datetime1">
               <a:rPr lang="en-US" smtClean="0"/>
-              <a:t>12/1/13</a:t>
+              <a:t>12/1/2013</a:t>
             </a:fld>
             <a:endParaRPr lang="en-US"/>
           </a:p>
@@ -3887,7 +3887,7 @@
           <a:p>
             <a:fld id="{BA1B2A8D-3EE6-6D42-9AD1-77F137BCFA1B}" type="datetime1">
               <a:rPr lang="en-US" smtClean="0"/>
-              <a:t>12/1/13</a:t>
+              <a:t>12/1/2013</a:t>
             </a:fld>
             <a:endParaRPr lang="en-US"/>
           </a:p>
@@ -4170,7 +4170,7 @@
           <a:p>
             <a:fld id="{0D54D886-D6CD-3A41-AE78-3523F6051162}" type="datetime1">
               <a:rPr lang="en-US" smtClean="0"/>
-              <a:t>12/1/13</a:t>
+              <a:t>12/1/2013</a:t>
             </a:fld>
             <a:endParaRPr lang="en-US"/>
           </a:p>
@@ -4538,7 +4538,7 @@
           <a:p>
             <a:fld id="{C93D052F-6C95-B442-BBF7-719656E80BD9}" type="datetime1">
               <a:rPr lang="en-US" smtClean="0"/>
-              <a:t>12/1/13</a:t>
+              <a:t>12/1/2013</a:t>
             </a:fld>
             <a:endParaRPr lang="en-US"/>
           </a:p>
@@ -5034,7 +5034,7 @@
           <a:p>
             <a:fld id="{33E4B11F-DC24-BF43-BFE9-5D333D8CE8B9}" type="datetime1">
               <a:rPr lang="en-US" smtClean="0"/>
-              <a:t>12/1/13</a:t>
+              <a:t>12/1/2013</a:t>
             </a:fld>
             <a:endParaRPr lang="en-US"/>
           </a:p>
@@ -5243,7 +5243,7 @@
           <a:p>
             <a:fld id="{AB7EA7DD-FAE8-1846-80D1-2CBCB864AE06}" type="datetime1">
               <a:rPr lang="en-US" smtClean="0"/>
-              <a:t>12/1/13</a:t>
+              <a:t>12/1/2013</a:t>
             </a:fld>
             <a:endParaRPr lang="en-US"/>
           </a:p>
@@ -5740,11 +5740,7 @@
           <a:p>
             <a:r>
               <a:rPr lang="en-US" dirty="0" smtClean="0"/>
-              <a:t>Present the </a:t>
-            </a:r>
-            <a:r>
-              <a:rPr lang="en-US" dirty="0" smtClean="0"/>
-              <a:t>Gameboy!</a:t>
+              <a:t>Present the Gameboy!</a:t>
             </a:r>
             <a:endParaRPr lang="en-US" dirty="0"/>
           </a:p>
@@ -5782,7 +5778,7 @@
   <p:timing>
     <p:tnLst>
       <p:par>
-        <p:cTn xmlns:p14="http://schemas.microsoft.com/office/powerpoint/2010/main" id="1" dur="indefinite" restart="never" nodeType="tmRoot"/>
+        <p:cTn id="1" dur="indefinite" restart="never" nodeType="tmRoot"/>
       </p:par>
     </p:tnLst>
   </p:timing>
@@ -5925,7 +5921,7 @@
   <p:timing>
     <p:tnLst>
       <p:par>
-        <p:cTn xmlns:p14="http://schemas.microsoft.com/office/powerpoint/2010/main" id="1" dur="indefinite" restart="never" nodeType="tmRoot"/>
+        <p:cTn id="1" dur="indefinite" restart="never" nodeType="tmRoot"/>
       </p:par>
     </p:tnLst>
   </p:timing>
@@ -6024,7 +6020,6 @@
               <a:rPr lang="en-US" dirty="0" smtClean="0"/>
               <a:t>Only necessary for larger games</a:t>
             </a:r>
-            <a:endParaRPr lang="en-US" dirty="0" smtClean="0"/>
           </a:p>
         </p:txBody>
       </p:sp>
@@ -6064,7 +6059,7 @@
   <p:timing>
     <p:tnLst>
       <p:par>
-        <p:cTn xmlns:p14="http://schemas.microsoft.com/office/powerpoint/2010/main" id="1" dur="indefinite" restart="never" nodeType="tmRoot"/>
+        <p:cTn id="1" dur="indefinite" restart="never" nodeType="tmRoot"/>
       </p:par>
     </p:tnLst>
   </p:timing>
@@ -6362,7 +6357,7 @@
   <p:timing>
     <p:tnLst>
       <p:par>
-        <p:cTn xmlns:p14="http://schemas.microsoft.com/office/powerpoint/2010/main" id="1" dur="indefinite" restart="never" nodeType="tmRoot"/>
+        <p:cTn id="1" dur="indefinite" restart="never" nodeType="tmRoot"/>
       </p:par>
     </p:tnLst>
   </p:timing>
@@ -6442,7 +6437,6 @@
               <a:rPr lang="en-US" dirty="0" smtClean="0"/>
               <a:t>Working to debug</a:t>
             </a:r>
-            <a:endParaRPr lang="en-US" dirty="0" smtClean="0"/>
           </a:p>
           <a:p>
             <a:r>
@@ -6456,7 +6450,6 @@
               <a:rPr lang="en-US" dirty="0" smtClean="0"/>
               <a:t>Time crunch and all that… You know.</a:t>
             </a:r>
-            <a:endParaRPr lang="en-US" dirty="0" smtClean="0"/>
           </a:p>
           <a:p>
             <a:r>
@@ -6563,7 +6556,7 @@
   <p:timing>
     <p:tnLst>
       <p:par>
-        <p:cTn xmlns:p14="http://schemas.microsoft.com/office/powerpoint/2010/main" id="1" dur="indefinite" restart="never" nodeType="tmRoot"/>
+        <p:cTn id="1" dur="indefinite" restart="never" nodeType="tmRoot"/>
       </p:par>
     </p:tnLst>
   </p:timing>
@@ -6629,7 +6622,6 @@
               <a:rPr lang="en-US" dirty="0" smtClean="0"/>
               <a:t>We can’t really play Tetris quite yet</a:t>
             </a:r>
-            <a:endParaRPr lang="en-US" dirty="0" smtClean="0"/>
           </a:p>
           <a:p>
             <a:r>
@@ -6688,7 +6680,7 @@
   <p:timing>
     <p:tnLst>
       <p:par>
-        <p:cTn xmlns:p14="http://schemas.microsoft.com/office/powerpoint/2010/main" id="1" dur="indefinite" restart="never" nodeType="tmRoot"/>
+        <p:cTn id="1" dur="indefinite" restart="never" nodeType="tmRoot"/>
       </p:par>
     </p:tnLst>
   </p:timing>
@@ -6752,27 +6744,20 @@
           <a:p>
             <a:r>
               <a:rPr lang="en-US" dirty="0" smtClean="0"/>
-              <a:t>Wednesday: </a:t>
-            </a:r>
-            <a:r>
-              <a:rPr lang="en-US" dirty="0" smtClean="0"/>
-              <a:t>Gameplay!</a:t>
-            </a:r>
-            <a:endParaRPr lang="en-US" dirty="0" smtClean="0"/>
+              <a:t>Wednesday: Gameplay!</a:t>
+            </a:r>
           </a:p>
           <a:p>
             <a:r>
               <a:rPr lang="en-US" dirty="0" smtClean="0"/>
               <a:t>Thursday: Link cable?</a:t>
             </a:r>
-            <a:endParaRPr lang="en-US" dirty="0" smtClean="0"/>
           </a:p>
           <a:p>
             <a:r>
               <a:rPr lang="en-US" dirty="0" smtClean="0"/>
               <a:t>Friday: Other games??</a:t>
             </a:r>
-            <a:endParaRPr lang="en-US" dirty="0" smtClean="0"/>
           </a:p>
         </p:txBody>
       </p:sp>
@@ -7082,23 +7067,14 @@
             <a:pPr lvl="1"/>
             <a:r>
               <a:rPr lang="en-US" dirty="0" smtClean="0"/>
-              <a:t>Or buys an expansion board with GPIO, VGA, and an AC97 </a:t>
-            </a:r>
-            <a:r>
-              <a:rPr lang="en-US" dirty="0" smtClean="0"/>
-              <a:t>chip</a:t>
-            </a:r>
-          </a:p>
-          <a:p>
-            <a:r>
-              <a:rPr lang="en-US" dirty="0" smtClean="0"/>
-              <a:t>You will never have enough time. </a:t>
-            </a:r>
-            <a:r>
-              <a:rPr lang="en-US" dirty="0" smtClean="0"/>
-              <a:t>Don’t even pretend.</a:t>
-            </a:r>
-            <a:endParaRPr lang="en-US" dirty="0" smtClean="0"/>
+              <a:t>Or buys an expansion board with GPIO, VGA, and an AC97 chip</a:t>
+            </a:r>
+          </a:p>
+          <a:p>
+            <a:r>
+              <a:rPr lang="en-US" dirty="0" smtClean="0"/>
+              <a:t>You will never have enough time. Don’t even pretend.</a:t>
+            </a:r>
           </a:p>
           <a:p>
             <a:endParaRPr lang="en-US" dirty="0" smtClean="0"/>
@@ -7333,20 +7309,11 @@
               <a:rPr lang="en-US" dirty="0" smtClean="0"/>
               <a:t>Gameboy running Tetris (almost)</a:t>
             </a:r>
-            <a:endParaRPr lang="en-US" dirty="0" smtClean="0"/>
-          </a:p>
-          <a:p>
-            <a:r>
-              <a:rPr lang="en-US" dirty="0" smtClean="0"/>
-              <a:t>It’s not </a:t>
-            </a:r>
-            <a:r>
-              <a:rPr lang="en-US" dirty="0" smtClean="0"/>
-              <a:t>finished (</a:t>
-            </a:r>
-            <a:r>
-              <a:rPr lang="en-US" dirty="0" smtClean="0"/>
-              <a:t>but it’s still fun)!</a:t>
+          </a:p>
+          <a:p>
+            <a:r>
+              <a:rPr lang="en-US" dirty="0" smtClean="0"/>
+              <a:t>It’s not finished (but it’s still fun)!</a:t>
             </a:r>
           </a:p>
           <a:p>
@@ -7383,14 +7350,12 @@
               <a:rPr lang="en-US" dirty="0" smtClean="0"/>
               <a:t>Demo plays in fast motion!</a:t>
             </a:r>
-            <a:endParaRPr lang="en-US" dirty="0" smtClean="0"/>
           </a:p>
           <a:p>
             <a:r>
               <a:rPr lang="en-US" dirty="0" smtClean="0"/>
               <a:t>Just a little further to go!</a:t>
             </a:r>
-            <a:endParaRPr lang="en-US" dirty="0" smtClean="0"/>
           </a:p>
         </p:txBody>
       </p:sp>
@@ -7460,7 +7425,7 @@
   <p:timing>
     <p:tnLst>
       <p:par>
-        <p:cTn xmlns:p14="http://schemas.microsoft.com/office/powerpoint/2010/main" id="1" dur="indefinite" restart="never" nodeType="tmRoot"/>
+        <p:cTn id="1" dur="indefinite" restart="never" nodeType="tmRoot"/>
       </p:par>
     </p:tnLst>
   </p:timing>
@@ -7586,7 +7551,6 @@
               <a:rPr lang="en-US" dirty="0" smtClean="0"/>
               <a:t>Exciting to come into lab and work on something you love</a:t>
             </a:r>
-            <a:endParaRPr lang="en-US" dirty="0" smtClean="0"/>
           </a:p>
           <a:p>
             <a:r>
@@ -7731,7 +7695,7 @@
   <p:timing>
     <p:tnLst>
       <p:par>
-        <p:cTn xmlns:p14="http://schemas.microsoft.com/office/powerpoint/2010/main" id="1" dur="indefinite" restart="never" nodeType="tmRoot"/>
+        <p:cTn id="1" dur="indefinite" restart="never" nodeType="tmRoot"/>
       </p:par>
     </p:tnLst>
   </p:timing>
@@ -7843,7 +7807,7 @@
   <p:timing>
     <p:tnLst>
       <p:par>
-        <p:cTn xmlns:p14="http://schemas.microsoft.com/office/powerpoint/2010/main" id="1" dur="indefinite" restart="never" nodeType="tmRoot"/>
+        <p:cTn id="1" dur="indefinite" restart="never" nodeType="tmRoot"/>
       </p:par>
     </p:tnLst>
   </p:timing>
@@ -7998,7 +7962,7 @@
   <p:timing>
     <p:tnLst>
       <p:par>
-        <p:cTn xmlns:p14="http://schemas.microsoft.com/office/powerpoint/2010/main" id="1" dur="indefinite" restart="never" nodeType="tmRoot"/>
+        <p:cTn id="1" dur="indefinite" restart="never" nodeType="tmRoot"/>
       </p:par>
     </p:tnLst>
   </p:timing>
@@ -8162,7 +8126,7 @@
   <p:timing>
     <p:tnLst>
       <p:par>
-        <p:cTn xmlns:p14="http://schemas.microsoft.com/office/powerpoint/2010/main" id="1" dur="indefinite" restart="never" nodeType="tmRoot"/>
+        <p:cTn id="1" dur="indefinite" restart="never" nodeType="tmRoot"/>
       </p:par>
     </p:tnLst>
   </p:timing>
@@ -8221,57 +8185,93 @@
         </p:nvSpPr>
         <p:spPr/>
         <p:txBody>
-          <a:bodyPr/>
-          <a:lstStyle/>
-          <a:p>
-            <a:r>
-              <a:rPr lang="en-US" dirty="0" smtClean="0"/>
-              <a:t>Promised:</a:t>
+          <a:bodyPr>
+            <a:normAutofit lnSpcReduction="10000"/>
+          </a:bodyPr>
+          <a:lstStyle/>
+          <a:p>
+            <a:r>
+              <a:rPr lang="en-US" dirty="0"/>
+              <a:t>Implementation:</a:t>
             </a:r>
           </a:p>
           <a:p>
             <a:pPr lvl="1"/>
             <a:r>
-              <a:rPr lang="en-US" dirty="0" smtClean="0"/>
-              <a:t>A working GPU and </a:t>
+              <a:rPr lang="en-US" dirty="0"/>
+              <a:t>Took code from </a:t>
             </a:r>
             <a:r>
               <a:rPr lang="en-US" dirty="0" err="1" smtClean="0"/>
-              <a:t>framebuffer</a:t>
-            </a:r>
-            <a:endParaRPr lang="en-US" dirty="0" smtClean="0"/>
-          </a:p>
-          <a:p>
-            <a:r>
-              <a:rPr lang="en-US" dirty="0" smtClean="0"/>
-              <a:t>Delivered:</a:t>
-            </a:r>
+              <a:t>TeamDragonForce</a:t>
+            </a:r>
+            <a:r>
+              <a:rPr lang="en-US" dirty="0" smtClean="0"/>
+              <a:t> and </a:t>
+            </a:r>
+            <a:r>
+              <a:rPr lang="en-US" dirty="0" err="1" smtClean="0"/>
+              <a:t>FpgaBoy</a:t>
+            </a:r>
+            <a:endParaRPr lang="en-US" dirty="0"/>
           </a:p>
           <a:p>
             <a:pPr lvl="1"/>
             <a:r>
-              <a:rPr lang="en-US" dirty="0" smtClean="0"/>
-              <a:t>A broken </a:t>
-            </a:r>
-            <a:r>
-              <a:rPr lang="en-US" dirty="0" err="1" smtClean="0"/>
-              <a:t>framebuffer</a:t>
-            </a:r>
-            <a:endParaRPr lang="en-US" dirty="0" smtClean="0"/>
+              <a:rPr lang="en-US" dirty="0"/>
+              <a:t>If you want access to memory-mapped registers, VRAM and OAM, </a:t>
+            </a:r>
+            <a:r>
+              <a:rPr lang="en-US" dirty="0" err="1"/>
+              <a:t>gotta</a:t>
+            </a:r>
+            <a:r>
+              <a:rPr lang="en-US" dirty="0"/>
+              <a:t> go through the GPU</a:t>
+            </a:r>
           </a:p>
           <a:p>
             <a:pPr lvl="1"/>
             <a:r>
-              <a:rPr lang="en-US" dirty="0" smtClean="0"/>
-              <a:t>No GPU functionality</a:t>
+              <a:rPr lang="en-US" dirty="0"/>
+              <a:t>2 </a:t>
+            </a:r>
+            <a:r>
+              <a:rPr lang="en-US" dirty="0" err="1"/>
+              <a:t>scanline</a:t>
+            </a:r>
+            <a:r>
+              <a:rPr lang="en-US" dirty="0"/>
+              <a:t> buffers (one for upper pixel bits, one for lower pixel bits</a:t>
+            </a:r>
+            <a:r>
+              <a:rPr lang="en-US" dirty="0" smtClean="0"/>
+              <a:t>)</a:t>
             </a:r>
           </a:p>
           <a:p>
             <a:pPr lvl="1"/>
             <a:r>
               <a:rPr lang="en-US" dirty="0" smtClean="0"/>
-              <a:t>No working DVI output to monitor</a:t>
-            </a:r>
+              <a:t>Double frame buffering</a:t>
+            </a:r>
+          </a:p>
+          <a:p>
+            <a:pPr lvl="1"/>
+            <a:r>
+              <a:rPr lang="en-US" dirty="0" smtClean="0"/>
+              <a:t>Conversion to fit monitor</a:t>
+            </a:r>
+          </a:p>
+          <a:p>
+            <a:pPr lvl="1"/>
+            <a:r>
+              <a:rPr lang="en-US" dirty="0" smtClean="0"/>
+              <a:t>Communicates via DVI with monitor</a:t>
+            </a:r>
+            <a:endParaRPr lang="en-US" dirty="0"/>
+          </a:p>
+          <a:p>
             <a:endParaRPr lang="en-US" dirty="0"/>
           </a:p>
         </p:txBody>
@@ -8312,7 +8312,7 @@
   <p:timing>
     <p:tnLst>
       <p:par>
-        <p:cTn xmlns:p14="http://schemas.microsoft.com/office/powerpoint/2010/main" id="1" dur="indefinite" restart="never" nodeType="tmRoot"/>
+        <p:cTn id="1" dur="indefinite" restart="never" nodeType="tmRoot"/>
       </p:par>
     </p:tnLst>
   </p:timing>
@@ -8383,84 +8383,44 @@
           <a:p>
             <a:r>
               <a:rPr lang="en-US" dirty="0" smtClean="0"/>
-              <a:t>Plans for the future:</a:t>
+              <a:t>Testing:</a:t>
             </a:r>
           </a:p>
           <a:p>
             <a:pPr lvl="1"/>
             <a:r>
               <a:rPr lang="en-US" dirty="0" smtClean="0"/>
-              <a:t>Very quickly get DVI properly set up and displaying something</a:t>
+              <a:t>Simulating the DVI module</a:t>
             </a:r>
           </a:p>
           <a:p>
             <a:pPr lvl="1"/>
             <a:r>
               <a:rPr lang="en-US" dirty="0" smtClean="0"/>
-              <a:t>Will probably use code from team </a:t>
-            </a:r>
-            <a:r>
-              <a:rPr lang="en-US" dirty="0" err="1" smtClean="0"/>
-              <a:t>Dragonforce</a:t>
-            </a:r>
-            <a:endParaRPr lang="en-US" dirty="0" smtClean="0"/>
+              <a:t>Loading it on the FPGA and making it produce colors on the monitor</a:t>
+            </a:r>
           </a:p>
           <a:p>
             <a:pPr lvl="1"/>
             <a:r>
               <a:rPr lang="en-US" dirty="0" smtClean="0"/>
-              <a:t>Get a working </a:t>
-            </a:r>
-            <a:r>
-              <a:rPr lang="en-US" dirty="0" err="1" smtClean="0"/>
-              <a:t>framebuffer</a:t>
-            </a:r>
-            <a:endParaRPr lang="en-US" dirty="0" smtClean="0"/>
+              <a:t>Simulating the GPU, comparing register simulation values with those in a great emulator Joseph found called </a:t>
+            </a:r>
+            <a:r>
+              <a:rPr lang="en-US" b="1" dirty="0" err="1" smtClean="0"/>
+              <a:t>bgb</a:t>
+            </a:r>
+            <a:r>
+              <a:rPr lang="en-US" dirty="0" smtClean="0"/>
+              <a:t>.</a:t>
+            </a:r>
           </a:p>
           <a:p>
             <a:pPr lvl="1"/>
             <a:r>
               <a:rPr lang="en-US" dirty="0" smtClean="0"/>
-              <a:t>Understand how the GPU works</a:t>
-            </a:r>
-          </a:p>
-          <a:p>
-            <a:r>
-              <a:rPr lang="en-US" dirty="0" smtClean="0"/>
-              <a:t>Revised schedule:</a:t>
-            </a:r>
-          </a:p>
-          <a:p>
-            <a:pPr lvl="1"/>
-            <a:r>
-              <a:rPr lang="en-US" dirty="0" smtClean="0"/>
-              <a:t>By Wednesday get test image on monitor</a:t>
-            </a:r>
-          </a:p>
-          <a:p>
-            <a:pPr lvl="1"/>
-            <a:r>
-              <a:rPr lang="en-US" dirty="0" smtClean="0"/>
-              <a:t>In two weeks have </a:t>
-            </a:r>
-            <a:r>
-              <a:rPr lang="en-US" dirty="0" err="1" smtClean="0"/>
-              <a:t>framebuffer</a:t>
-            </a:r>
-            <a:r>
-              <a:rPr lang="en-US" dirty="0" smtClean="0"/>
-              <a:t> fully functional</a:t>
-            </a:r>
-          </a:p>
-          <a:p>
-            <a:pPr lvl="1"/>
-            <a:r>
-              <a:rPr lang="en-US" dirty="0" smtClean="0"/>
-              <a:t>About one month behind schedule</a:t>
-            </a:r>
-          </a:p>
-          <a:p>
-            <a:pPr lvl="1"/>
+              <a:t>Loading it on the FPGA and seeing what happens.</a:t>
+            </a:r>
             <a:endParaRPr lang="en-US" dirty="0"/>
           </a:p>
         </p:txBody>
@@ -8501,7 +8461,7 @@
   <p:timing>
     <p:tnLst>
       <p:par>
-        <p:cTn xmlns:p14="http://schemas.microsoft.com/office/powerpoint/2010/main" id="1" dur="indefinite" restart="never" nodeType="tmRoot"/>
+        <p:cTn id="1" dur="indefinite" restart="never" nodeType="tmRoot"/>
       </p:par>
     </p:tnLst>
   </p:timing>
@@ -8604,15 +8564,7 @@
             <a:pPr lvl="1"/>
             <a:r>
               <a:rPr lang="en-US" dirty="0" smtClean="0"/>
-              <a:t>Amplitude </a:t>
-            </a:r>
-            <a:r>
-              <a:rPr lang="en-US" dirty="0" smtClean="0"/>
-              <a:t>control using rotary </a:t>
-            </a:r>
-            <a:r>
-              <a:rPr lang="en-US" dirty="0" smtClean="0"/>
-              <a:t>controller</a:t>
+              <a:t>Amplitude control using rotary controller</a:t>
             </a:r>
           </a:p>
           <a:p>
@@ -8621,7 +8573,6 @@
               <a:rPr lang="en-US" dirty="0" smtClean="0"/>
               <a:t>18 memory-mapped registers for CPU communication</a:t>
             </a:r>
-            <a:endParaRPr lang="en-US" dirty="0" smtClean="0"/>
           </a:p>
           <a:p>
             <a:endParaRPr lang="en-US" dirty="0"/>
@@ -8664,7 +8615,7 @@
   <p:timing>
     <p:tnLst>
       <p:par>
-        <p:cTn xmlns:p14="http://schemas.microsoft.com/office/powerpoint/2010/main" id="1" dur="indefinite" restart="never" nodeType="tmRoot"/>
+        <p:cTn id="1" dur="indefinite" restart="never" nodeType="tmRoot"/>
       </p:par>
     </p:tnLst>
   </p:timing>
@@ -8804,7 +8755,7 @@
   <p:timing>
     <p:tnLst>
       <p:par>
-        <p:cTn xmlns:p14="http://schemas.microsoft.com/office/powerpoint/2010/main" id="1" dur="indefinite" restart="never" nodeType="tmRoot"/>
+        <p:cTn id="1" dur="indefinite" restart="never" nodeType="tmRoot"/>
       </p:par>
     </p:tnLst>
   </p:timing>

</xml_diff>